<commit_message>
Update ppt presentation in docs
</commit_message>
<xml_diff>
--- a/docs/OpenDrive.pptx
+++ b/docs/OpenDrive.pptx
@@ -4,11 +4,15 @@
   <p:sldMasterIdLst>
     <p:sldMasterId id="2147483648" r:id="rId1"/>
   </p:sldMasterIdLst>
+  <p:notesMasterIdLst>
+    <p:notesMasterId r:id="rId7"/>
+  </p:notesMasterIdLst>
   <p:sldIdLst>
     <p:sldId id="256" r:id="rId2"/>
     <p:sldId id="257" r:id="rId3"/>
     <p:sldId id="258" r:id="rId4"/>
-    <p:sldId id="259" r:id="rId5"/>
+    <p:sldId id="260" r:id="rId5"/>
+    <p:sldId id="259" r:id="rId6"/>
   </p:sldIdLst>
   <p:sldSz cx="12192000" cy="6858000"/>
   <p:notesSz cx="6858000" cy="9144000"/>
@@ -115,6 +119,355 @@
 </p:presentation>
 </file>
 
+<file path=ppt/notesMasters/notesMaster1.xml><?xml version="1.0" encoding="utf-8"?>
+<p:notesMaster xmlns:a="http://schemas.openxmlformats.org/drawingml/2006/main" xmlns:r="http://schemas.openxmlformats.org/officeDocument/2006/relationships" xmlns:p="http://schemas.openxmlformats.org/presentationml/2006/main">
+  <p:cSld>
+    <p:bg>
+      <p:bgRef idx="1001">
+        <a:schemeClr val="bg1"/>
+      </p:bgRef>
+    </p:bg>
+    <p:spTree>
+      <p:nvGrpSpPr>
+        <p:cNvPr id="1" name=""/>
+        <p:cNvGrpSpPr/>
+        <p:nvPr/>
+      </p:nvGrpSpPr>
+      <p:grpSpPr>
+        <a:xfrm>
+          <a:off x="0" y="0"/>
+          <a:ext cx="0" cy="0"/>
+          <a:chOff x="0" y="0"/>
+          <a:chExt cx="0" cy="0"/>
+        </a:xfrm>
+      </p:grpSpPr>
+      <p:sp>
+        <p:nvSpPr>
+          <p:cNvPr id="2" name="Kopfzeilenplatzhalter 1"/>
+          <p:cNvSpPr>
+            <a:spLocks noGrp="1"/>
+          </p:cNvSpPr>
+          <p:nvPr>
+            <p:ph type="hdr" sz="quarter"/>
+          </p:nvPr>
+        </p:nvSpPr>
+        <p:spPr>
+          <a:xfrm>
+            <a:off x="0" y="0"/>
+            <a:ext cx="2971800" cy="458788"/>
+          </a:xfrm>
+          <a:prstGeom prst="rect">
+            <a:avLst/>
+          </a:prstGeom>
+        </p:spPr>
+        <p:txBody>
+          <a:bodyPr vert="horz" lIns="91440" tIns="45720" rIns="91440" bIns="45720" rtlCol="0"/>
+          <a:lstStyle>
+            <a:lvl1pPr algn="l">
+              <a:defRPr sz="1200"/>
+            </a:lvl1pPr>
+          </a:lstStyle>
+          <a:p>
+            <a:endParaRPr lang="de-DE"/>
+          </a:p>
+        </p:txBody>
+      </p:sp>
+      <p:sp>
+        <p:nvSpPr>
+          <p:cNvPr id="3" name="Datumsplatzhalter 2"/>
+          <p:cNvSpPr>
+            <a:spLocks noGrp="1"/>
+          </p:cNvSpPr>
+          <p:nvPr>
+            <p:ph type="dt" idx="1"/>
+          </p:nvPr>
+        </p:nvSpPr>
+        <p:spPr>
+          <a:xfrm>
+            <a:off x="3884613" y="0"/>
+            <a:ext cx="2971800" cy="458788"/>
+          </a:xfrm>
+          <a:prstGeom prst="rect">
+            <a:avLst/>
+          </a:prstGeom>
+        </p:spPr>
+        <p:txBody>
+          <a:bodyPr vert="horz" lIns="91440" tIns="45720" rIns="91440" bIns="45720" rtlCol="0"/>
+          <a:lstStyle>
+            <a:lvl1pPr algn="r">
+              <a:defRPr sz="1200"/>
+            </a:lvl1pPr>
+          </a:lstStyle>
+          <a:p>
+            <a:fld id="{7CD60D63-6C16-445A-93AC-27ADA9BCA6F5}" type="datetimeFigureOut">
+              <a:rPr lang="de-DE" smtClean="0"/>
+              <a:t>20.06.2019</a:t>
+            </a:fld>
+            <a:endParaRPr lang="de-DE"/>
+          </a:p>
+        </p:txBody>
+      </p:sp>
+      <p:sp>
+        <p:nvSpPr>
+          <p:cNvPr id="4" name="Folienbildplatzhalter 3"/>
+          <p:cNvSpPr>
+            <a:spLocks noGrp="1" noRot="1" noChangeAspect="1"/>
+          </p:cNvSpPr>
+          <p:nvPr>
+            <p:ph type="sldImg" idx="2"/>
+          </p:nvPr>
+        </p:nvSpPr>
+        <p:spPr>
+          <a:xfrm>
+            <a:off x="685800" y="1143000"/>
+            <a:ext cx="5486400" cy="3086100"/>
+          </a:xfrm>
+          <a:prstGeom prst="rect">
+            <a:avLst/>
+          </a:prstGeom>
+          <a:noFill/>
+          <a:ln w="12700">
+            <a:solidFill>
+              <a:prstClr val="black"/>
+            </a:solidFill>
+          </a:ln>
+        </p:spPr>
+        <p:txBody>
+          <a:bodyPr vert="horz" lIns="91440" tIns="45720" rIns="91440" bIns="45720" rtlCol="0" anchor="ctr"/>
+          <a:lstStyle/>
+          <a:p>
+            <a:endParaRPr lang="de-DE"/>
+          </a:p>
+        </p:txBody>
+      </p:sp>
+      <p:sp>
+        <p:nvSpPr>
+          <p:cNvPr id="5" name="Notizenplatzhalter 4"/>
+          <p:cNvSpPr>
+            <a:spLocks noGrp="1"/>
+          </p:cNvSpPr>
+          <p:nvPr>
+            <p:ph type="body" sz="quarter" idx="3"/>
+          </p:nvPr>
+        </p:nvSpPr>
+        <p:spPr>
+          <a:xfrm>
+            <a:off x="685800" y="4400550"/>
+            <a:ext cx="5486400" cy="3600450"/>
+          </a:xfrm>
+          <a:prstGeom prst="rect">
+            <a:avLst/>
+          </a:prstGeom>
+        </p:spPr>
+        <p:txBody>
+          <a:bodyPr vert="horz" lIns="91440" tIns="45720" rIns="91440" bIns="45720" rtlCol="0"/>
+          <a:lstStyle/>
+          <a:p>
+            <a:pPr lvl="0"/>
+            <a:r>
+              <a:rPr lang="de-DE"/>
+              <a:t>Mastertextformat bearbeiten</a:t>
+            </a:r>
+          </a:p>
+          <a:p>
+            <a:pPr lvl="1"/>
+            <a:r>
+              <a:rPr lang="de-DE"/>
+              <a:t>Zweite Ebene</a:t>
+            </a:r>
+          </a:p>
+          <a:p>
+            <a:pPr lvl="2"/>
+            <a:r>
+              <a:rPr lang="de-DE"/>
+              <a:t>Dritte Ebene</a:t>
+            </a:r>
+          </a:p>
+          <a:p>
+            <a:pPr lvl="3"/>
+            <a:r>
+              <a:rPr lang="de-DE"/>
+              <a:t>Vierte Ebene</a:t>
+            </a:r>
+          </a:p>
+          <a:p>
+            <a:pPr lvl="4"/>
+            <a:r>
+              <a:rPr lang="de-DE"/>
+              <a:t>Fünfte Ebene</a:t>
+            </a:r>
+          </a:p>
+        </p:txBody>
+      </p:sp>
+      <p:sp>
+        <p:nvSpPr>
+          <p:cNvPr id="6" name="Fußzeilenplatzhalter 5"/>
+          <p:cNvSpPr>
+            <a:spLocks noGrp="1"/>
+          </p:cNvSpPr>
+          <p:nvPr>
+            <p:ph type="ftr" sz="quarter" idx="4"/>
+          </p:nvPr>
+        </p:nvSpPr>
+        <p:spPr>
+          <a:xfrm>
+            <a:off x="0" y="8685213"/>
+            <a:ext cx="2971800" cy="458787"/>
+          </a:xfrm>
+          <a:prstGeom prst="rect">
+            <a:avLst/>
+          </a:prstGeom>
+        </p:spPr>
+        <p:txBody>
+          <a:bodyPr vert="horz" lIns="91440" tIns="45720" rIns="91440" bIns="45720" rtlCol="0" anchor="b"/>
+          <a:lstStyle>
+            <a:lvl1pPr algn="l">
+              <a:defRPr sz="1200"/>
+            </a:lvl1pPr>
+          </a:lstStyle>
+          <a:p>
+            <a:endParaRPr lang="de-DE"/>
+          </a:p>
+        </p:txBody>
+      </p:sp>
+      <p:sp>
+        <p:nvSpPr>
+          <p:cNvPr id="7" name="Foliennummernplatzhalter 6"/>
+          <p:cNvSpPr>
+            <a:spLocks noGrp="1"/>
+          </p:cNvSpPr>
+          <p:nvPr>
+            <p:ph type="sldNum" sz="quarter" idx="5"/>
+          </p:nvPr>
+        </p:nvSpPr>
+        <p:spPr>
+          <a:xfrm>
+            <a:off x="3884613" y="8685213"/>
+            <a:ext cx="2971800" cy="458787"/>
+          </a:xfrm>
+          <a:prstGeom prst="rect">
+            <a:avLst/>
+          </a:prstGeom>
+        </p:spPr>
+        <p:txBody>
+          <a:bodyPr vert="horz" lIns="91440" tIns="45720" rIns="91440" bIns="45720" rtlCol="0" anchor="b"/>
+          <a:lstStyle>
+            <a:lvl1pPr algn="r">
+              <a:defRPr sz="1200"/>
+            </a:lvl1pPr>
+          </a:lstStyle>
+          <a:p>
+            <a:fld id="{957DA60D-7A1E-4704-939B-1249B5403B22}" type="slidenum">
+              <a:rPr lang="de-DE" smtClean="0"/>
+              <a:t>‹Nr.›</a:t>
+            </a:fld>
+            <a:endParaRPr lang="de-DE"/>
+          </a:p>
+        </p:txBody>
+      </p:sp>
+    </p:spTree>
+    <p:extLst>
+      <p:ext uri="{BB962C8B-B14F-4D97-AF65-F5344CB8AC3E}">
+        <p14:creationId xmlns:p14="http://schemas.microsoft.com/office/powerpoint/2010/main" val="2397750561"/>
+      </p:ext>
+    </p:extLst>
+  </p:cSld>
+  <p:clrMap bg1="lt1" tx1="dk1" bg2="lt2" tx2="dk2" accent1="accent1" accent2="accent2" accent3="accent3" accent4="accent4" accent5="accent5" accent6="accent6" hlink="hlink" folHlink="folHlink"/>
+  <p:notesStyle>
+    <a:lvl1pPr marL="0" algn="l" defTabSz="914400" rtl="0" eaLnBrk="1" latinLnBrk="0" hangingPunct="1">
+      <a:defRPr sz="1200" kern="1200">
+        <a:solidFill>
+          <a:schemeClr val="tx1"/>
+        </a:solidFill>
+        <a:latin typeface="+mn-lt"/>
+        <a:ea typeface="+mn-ea"/>
+        <a:cs typeface="+mn-cs"/>
+      </a:defRPr>
+    </a:lvl1pPr>
+    <a:lvl2pPr marL="457200" algn="l" defTabSz="914400" rtl="0" eaLnBrk="1" latinLnBrk="0" hangingPunct="1">
+      <a:defRPr sz="1200" kern="1200">
+        <a:solidFill>
+          <a:schemeClr val="tx1"/>
+        </a:solidFill>
+        <a:latin typeface="+mn-lt"/>
+        <a:ea typeface="+mn-ea"/>
+        <a:cs typeface="+mn-cs"/>
+      </a:defRPr>
+    </a:lvl2pPr>
+    <a:lvl3pPr marL="914400" algn="l" defTabSz="914400" rtl="0" eaLnBrk="1" latinLnBrk="0" hangingPunct="1">
+      <a:defRPr sz="1200" kern="1200">
+        <a:solidFill>
+          <a:schemeClr val="tx1"/>
+        </a:solidFill>
+        <a:latin typeface="+mn-lt"/>
+        <a:ea typeface="+mn-ea"/>
+        <a:cs typeface="+mn-cs"/>
+      </a:defRPr>
+    </a:lvl3pPr>
+    <a:lvl4pPr marL="1371600" algn="l" defTabSz="914400" rtl="0" eaLnBrk="1" latinLnBrk="0" hangingPunct="1">
+      <a:defRPr sz="1200" kern="1200">
+        <a:solidFill>
+          <a:schemeClr val="tx1"/>
+        </a:solidFill>
+        <a:latin typeface="+mn-lt"/>
+        <a:ea typeface="+mn-ea"/>
+        <a:cs typeface="+mn-cs"/>
+      </a:defRPr>
+    </a:lvl4pPr>
+    <a:lvl5pPr marL="1828800" algn="l" defTabSz="914400" rtl="0" eaLnBrk="1" latinLnBrk="0" hangingPunct="1">
+      <a:defRPr sz="1200" kern="1200">
+        <a:solidFill>
+          <a:schemeClr val="tx1"/>
+        </a:solidFill>
+        <a:latin typeface="+mn-lt"/>
+        <a:ea typeface="+mn-ea"/>
+        <a:cs typeface="+mn-cs"/>
+      </a:defRPr>
+    </a:lvl5pPr>
+    <a:lvl6pPr marL="2286000" algn="l" defTabSz="914400" rtl="0" eaLnBrk="1" latinLnBrk="0" hangingPunct="1">
+      <a:defRPr sz="1200" kern="1200">
+        <a:solidFill>
+          <a:schemeClr val="tx1"/>
+        </a:solidFill>
+        <a:latin typeface="+mn-lt"/>
+        <a:ea typeface="+mn-ea"/>
+        <a:cs typeface="+mn-cs"/>
+      </a:defRPr>
+    </a:lvl6pPr>
+    <a:lvl7pPr marL="2743200" algn="l" defTabSz="914400" rtl="0" eaLnBrk="1" latinLnBrk="0" hangingPunct="1">
+      <a:defRPr sz="1200" kern="1200">
+        <a:solidFill>
+          <a:schemeClr val="tx1"/>
+        </a:solidFill>
+        <a:latin typeface="+mn-lt"/>
+        <a:ea typeface="+mn-ea"/>
+        <a:cs typeface="+mn-cs"/>
+      </a:defRPr>
+    </a:lvl7pPr>
+    <a:lvl8pPr marL="3200400" algn="l" defTabSz="914400" rtl="0" eaLnBrk="1" latinLnBrk="0" hangingPunct="1">
+      <a:defRPr sz="1200" kern="1200">
+        <a:solidFill>
+          <a:schemeClr val="tx1"/>
+        </a:solidFill>
+        <a:latin typeface="+mn-lt"/>
+        <a:ea typeface="+mn-ea"/>
+        <a:cs typeface="+mn-cs"/>
+      </a:defRPr>
+    </a:lvl8pPr>
+    <a:lvl9pPr marL="3657600" algn="l" defTabSz="914400" rtl="0" eaLnBrk="1" latinLnBrk="0" hangingPunct="1">
+      <a:defRPr sz="1200" kern="1200">
+        <a:solidFill>
+          <a:schemeClr val="tx1"/>
+        </a:solidFill>
+        <a:latin typeface="+mn-lt"/>
+        <a:ea typeface="+mn-ea"/>
+        <a:cs typeface="+mn-cs"/>
+      </a:defRPr>
+    </a:lvl9pPr>
+  </p:notesStyle>
+</p:notesMaster>
+</file>
+
 <file path=ppt/slideLayouts/slideLayout1.xml><?xml version="1.0" encoding="utf-8"?>
 <p:sldLayout xmlns:a="http://schemas.openxmlformats.org/drawingml/2006/main" xmlns:r="http://schemas.openxmlformats.org/officeDocument/2006/relationships" xmlns:p="http://schemas.openxmlformats.org/presentationml/2006/main" type="title" preserve="1">
   <p:cSld name="Titelfolie">
@@ -264,9 +617,9 @@
           <a:p>
             <a:fld id="{74357C96-11B2-4D44-988A-20F1D20A6DE9}" type="datetimeFigureOut">
               <a:rPr lang="en-US" smtClean="0"/>
-              <a:t>6/18/2019</a:t>
+              <a:t>6/20/2019</a:t>
             </a:fld>
-            <a:endParaRPr lang="en-US" dirty="0"/>
+            <a:endParaRPr lang="en-US"/>
           </a:p>
         </p:txBody>
       </p:sp>
@@ -291,7 +644,7 @@
           <a:bodyPr/>
           <a:lstStyle/>
           <a:p>
-            <a:endParaRPr lang="en-US" dirty="0"/>
+            <a:endParaRPr lang="en-US"/>
           </a:p>
         </p:txBody>
       </p:sp>
@@ -320,7 +673,7 @@
               <a:rPr lang="en-US" smtClean="0"/>
               <a:t>‹Nr.›</a:t>
             </a:fld>
-            <a:endParaRPr lang="en-US" dirty="0"/>
+            <a:endParaRPr lang="en-US"/>
           </a:p>
         </p:txBody>
       </p:sp>
@@ -464,9 +817,9 @@
           <a:p>
             <a:fld id="{74357C96-11B2-4D44-988A-20F1D20A6DE9}" type="datetimeFigureOut">
               <a:rPr lang="en-US" smtClean="0"/>
-              <a:t>6/18/2019</a:t>
+              <a:t>6/20/2019</a:t>
             </a:fld>
-            <a:endParaRPr lang="en-US" dirty="0"/>
+            <a:endParaRPr lang="en-US"/>
           </a:p>
         </p:txBody>
       </p:sp>
@@ -491,7 +844,7 @@
           <a:bodyPr/>
           <a:lstStyle/>
           <a:p>
-            <a:endParaRPr lang="en-US" dirty="0"/>
+            <a:endParaRPr lang="en-US"/>
           </a:p>
         </p:txBody>
       </p:sp>
@@ -520,7 +873,7 @@
               <a:rPr lang="en-US" smtClean="0"/>
               <a:t>‹Nr.›</a:t>
             </a:fld>
-            <a:endParaRPr lang="en-US" dirty="0"/>
+            <a:endParaRPr lang="en-US"/>
           </a:p>
         </p:txBody>
       </p:sp>
@@ -674,9 +1027,9 @@
           <a:p>
             <a:fld id="{74357C96-11B2-4D44-988A-20F1D20A6DE9}" type="datetimeFigureOut">
               <a:rPr lang="en-US" smtClean="0"/>
-              <a:t>6/18/2019</a:t>
+              <a:t>6/20/2019</a:t>
             </a:fld>
-            <a:endParaRPr lang="en-US" dirty="0"/>
+            <a:endParaRPr lang="en-US"/>
           </a:p>
         </p:txBody>
       </p:sp>
@@ -701,7 +1054,7 @@
           <a:bodyPr/>
           <a:lstStyle/>
           <a:p>
-            <a:endParaRPr lang="en-US" dirty="0"/>
+            <a:endParaRPr lang="en-US"/>
           </a:p>
         </p:txBody>
       </p:sp>
@@ -730,7 +1083,7 @@
               <a:rPr lang="en-US" smtClean="0"/>
               <a:t>‹Nr.›</a:t>
             </a:fld>
-            <a:endParaRPr lang="en-US" dirty="0"/>
+            <a:endParaRPr lang="en-US"/>
           </a:p>
         </p:txBody>
       </p:sp>
@@ -874,9 +1227,9 @@
           <a:p>
             <a:fld id="{74357C96-11B2-4D44-988A-20F1D20A6DE9}" type="datetimeFigureOut">
               <a:rPr lang="en-US" smtClean="0"/>
-              <a:t>6/18/2019</a:t>
+              <a:t>6/20/2019</a:t>
             </a:fld>
-            <a:endParaRPr lang="en-US" dirty="0"/>
+            <a:endParaRPr lang="en-US"/>
           </a:p>
         </p:txBody>
       </p:sp>
@@ -901,7 +1254,7 @@
           <a:bodyPr/>
           <a:lstStyle/>
           <a:p>
-            <a:endParaRPr lang="en-US" dirty="0"/>
+            <a:endParaRPr lang="en-US"/>
           </a:p>
         </p:txBody>
       </p:sp>
@@ -930,7 +1283,7 @@
               <a:rPr lang="en-US" smtClean="0"/>
               <a:t>‹Nr.›</a:t>
             </a:fld>
-            <a:endParaRPr lang="en-US" dirty="0"/>
+            <a:endParaRPr lang="en-US"/>
           </a:p>
         </p:txBody>
       </p:sp>
@@ -1150,9 +1503,9 @@
           <a:p>
             <a:fld id="{74357C96-11B2-4D44-988A-20F1D20A6DE9}" type="datetimeFigureOut">
               <a:rPr lang="en-US" smtClean="0"/>
-              <a:t>6/18/2019</a:t>
+              <a:t>6/20/2019</a:t>
             </a:fld>
-            <a:endParaRPr lang="en-US" dirty="0"/>
+            <a:endParaRPr lang="en-US"/>
           </a:p>
         </p:txBody>
       </p:sp>
@@ -1177,7 +1530,7 @@
           <a:bodyPr/>
           <a:lstStyle/>
           <a:p>
-            <a:endParaRPr lang="en-US" dirty="0"/>
+            <a:endParaRPr lang="en-US"/>
           </a:p>
         </p:txBody>
       </p:sp>
@@ -1206,7 +1559,7 @@
               <a:rPr lang="en-US" smtClean="0"/>
               <a:t>‹Nr.›</a:t>
             </a:fld>
-            <a:endParaRPr lang="en-US" dirty="0"/>
+            <a:endParaRPr lang="en-US"/>
           </a:p>
         </p:txBody>
       </p:sp>
@@ -1418,9 +1771,9 @@
           <a:p>
             <a:fld id="{74357C96-11B2-4D44-988A-20F1D20A6DE9}" type="datetimeFigureOut">
               <a:rPr lang="en-US" smtClean="0"/>
-              <a:t>6/18/2019</a:t>
+              <a:t>6/20/2019</a:t>
             </a:fld>
-            <a:endParaRPr lang="en-US" dirty="0"/>
+            <a:endParaRPr lang="en-US"/>
           </a:p>
         </p:txBody>
       </p:sp>
@@ -1445,7 +1798,7 @@
           <a:bodyPr/>
           <a:lstStyle/>
           <a:p>
-            <a:endParaRPr lang="en-US" dirty="0"/>
+            <a:endParaRPr lang="en-US"/>
           </a:p>
         </p:txBody>
       </p:sp>
@@ -1474,7 +1827,7 @@
               <a:rPr lang="en-US" smtClean="0"/>
               <a:t>‹Nr.›</a:t>
             </a:fld>
-            <a:endParaRPr lang="en-US" dirty="0"/>
+            <a:endParaRPr lang="en-US"/>
           </a:p>
         </p:txBody>
       </p:sp>
@@ -1833,9 +2186,9 @@
           <a:p>
             <a:fld id="{74357C96-11B2-4D44-988A-20F1D20A6DE9}" type="datetimeFigureOut">
               <a:rPr lang="en-US" smtClean="0"/>
-              <a:t>6/18/2019</a:t>
+              <a:t>6/20/2019</a:t>
             </a:fld>
-            <a:endParaRPr lang="en-US" dirty="0"/>
+            <a:endParaRPr lang="en-US"/>
           </a:p>
         </p:txBody>
       </p:sp>
@@ -1860,7 +2213,7 @@
           <a:bodyPr/>
           <a:lstStyle/>
           <a:p>
-            <a:endParaRPr lang="en-US" dirty="0"/>
+            <a:endParaRPr lang="en-US"/>
           </a:p>
         </p:txBody>
       </p:sp>
@@ -1889,7 +2242,7 @@
               <a:rPr lang="en-US" smtClean="0"/>
               <a:t>‹Nr.›</a:t>
             </a:fld>
-            <a:endParaRPr lang="en-US" dirty="0"/>
+            <a:endParaRPr lang="en-US"/>
           </a:p>
         </p:txBody>
       </p:sp>
@@ -1975,9 +2328,9 @@
           <a:p>
             <a:fld id="{74357C96-11B2-4D44-988A-20F1D20A6DE9}" type="datetimeFigureOut">
               <a:rPr lang="en-US" smtClean="0"/>
-              <a:t>6/18/2019</a:t>
+              <a:t>6/20/2019</a:t>
             </a:fld>
-            <a:endParaRPr lang="en-US" dirty="0"/>
+            <a:endParaRPr lang="en-US"/>
           </a:p>
         </p:txBody>
       </p:sp>
@@ -2002,7 +2355,7 @@
           <a:bodyPr/>
           <a:lstStyle/>
           <a:p>
-            <a:endParaRPr lang="en-US" dirty="0"/>
+            <a:endParaRPr lang="en-US"/>
           </a:p>
         </p:txBody>
       </p:sp>
@@ -2031,7 +2384,7 @@
               <a:rPr lang="en-US" smtClean="0"/>
               <a:t>‹Nr.›</a:t>
             </a:fld>
-            <a:endParaRPr lang="en-US" dirty="0"/>
+            <a:endParaRPr lang="en-US"/>
           </a:p>
         </p:txBody>
       </p:sp>
@@ -2088,9 +2441,9 @@
           <a:p>
             <a:fld id="{74357C96-11B2-4D44-988A-20F1D20A6DE9}" type="datetimeFigureOut">
               <a:rPr lang="en-US" smtClean="0"/>
-              <a:t>6/18/2019</a:t>
+              <a:t>6/20/2019</a:t>
             </a:fld>
-            <a:endParaRPr lang="en-US" dirty="0"/>
+            <a:endParaRPr lang="en-US"/>
           </a:p>
         </p:txBody>
       </p:sp>
@@ -2115,7 +2468,7 @@
           <a:bodyPr/>
           <a:lstStyle/>
           <a:p>
-            <a:endParaRPr lang="en-US" dirty="0"/>
+            <a:endParaRPr lang="en-US"/>
           </a:p>
         </p:txBody>
       </p:sp>
@@ -2144,7 +2497,7 @@
               <a:rPr lang="en-US" smtClean="0"/>
               <a:t>‹Nr.›</a:t>
             </a:fld>
-            <a:endParaRPr lang="en-US" dirty="0"/>
+            <a:endParaRPr lang="en-US"/>
           </a:p>
         </p:txBody>
       </p:sp>
@@ -2401,9 +2754,9 @@
           <a:p>
             <a:fld id="{74357C96-11B2-4D44-988A-20F1D20A6DE9}" type="datetimeFigureOut">
               <a:rPr lang="en-US" smtClean="0"/>
-              <a:t>6/18/2019</a:t>
+              <a:t>6/20/2019</a:t>
             </a:fld>
-            <a:endParaRPr lang="en-US" dirty="0"/>
+            <a:endParaRPr lang="en-US"/>
           </a:p>
         </p:txBody>
       </p:sp>
@@ -2428,7 +2781,7 @@
           <a:bodyPr/>
           <a:lstStyle/>
           <a:p>
-            <a:endParaRPr lang="en-US" dirty="0"/>
+            <a:endParaRPr lang="en-US"/>
           </a:p>
         </p:txBody>
       </p:sp>
@@ -2457,7 +2810,7 @@
               <a:rPr lang="en-US" smtClean="0"/>
               <a:t>‹Nr.›</a:t>
             </a:fld>
-            <a:endParaRPr lang="en-US" dirty="0"/>
+            <a:endParaRPr lang="en-US"/>
           </a:p>
         </p:txBody>
       </p:sp>
@@ -2592,7 +2945,7 @@
             </a:lvl9pPr>
           </a:lstStyle>
           <a:p>
-            <a:endParaRPr lang="en-US" dirty="0"/>
+            <a:endParaRPr lang="en-US"/>
           </a:p>
         </p:txBody>
       </p:sp>
@@ -2690,9 +3043,9 @@
           <a:p>
             <a:fld id="{74357C96-11B2-4D44-988A-20F1D20A6DE9}" type="datetimeFigureOut">
               <a:rPr lang="en-US" smtClean="0"/>
-              <a:t>6/18/2019</a:t>
+              <a:t>6/20/2019</a:t>
             </a:fld>
-            <a:endParaRPr lang="en-US" dirty="0"/>
+            <a:endParaRPr lang="en-US"/>
           </a:p>
         </p:txBody>
       </p:sp>
@@ -2717,7 +3070,7 @@
           <a:bodyPr/>
           <a:lstStyle/>
           <a:p>
-            <a:endParaRPr lang="en-US" dirty="0"/>
+            <a:endParaRPr lang="en-US"/>
           </a:p>
         </p:txBody>
       </p:sp>
@@ -2746,7 +3099,7 @@
               <a:rPr lang="en-US" smtClean="0"/>
               <a:t>‹Nr.›</a:t>
             </a:fld>
-            <a:endParaRPr lang="en-US" dirty="0"/>
+            <a:endParaRPr lang="en-US"/>
           </a:p>
         </p:txBody>
       </p:sp>
@@ -2767,9 +3120,19 @@
 <p:sldMaster xmlns:a="http://schemas.openxmlformats.org/drawingml/2006/main" xmlns:r="http://schemas.openxmlformats.org/officeDocument/2006/relationships" xmlns:p="http://schemas.openxmlformats.org/presentationml/2006/main">
   <p:cSld>
     <p:bg>
-      <p:bgRef idx="1001">
-        <a:schemeClr val="bg1"/>
-      </p:bgRef>
+      <p:bgPr>
+        <a:blipFill dpi="0" rotWithShape="1">
+          <a:blip r:embed="rId13">
+            <a:alphaModFix amt="55000"/>
+            <a:lum/>
+          </a:blip>
+          <a:srcRect/>
+          <a:stretch>
+            <a:fillRect t="-6000" b="-6000"/>
+          </a:stretch>
+        </a:blipFill>
+        <a:effectLst/>
+      </p:bgPr>
     </p:bg>
     <p:spTree>
       <p:nvGrpSpPr>
@@ -2933,9 +3296,9 @@
           <a:p>
             <a:fld id="{74357C96-11B2-4D44-988A-20F1D20A6DE9}" type="datetimeFigureOut">
               <a:rPr lang="en-US" smtClean="0"/>
-              <a:t>6/18/2019</a:t>
+              <a:t>6/20/2019</a:t>
             </a:fld>
-            <a:endParaRPr lang="en-US" dirty="0"/>
+            <a:endParaRPr lang="en-US"/>
           </a:p>
         </p:txBody>
       </p:sp>
@@ -2978,7 +3341,7 @@
             </a:lvl1pPr>
           </a:lstStyle>
           <a:p>
-            <a:endParaRPr lang="en-US" dirty="0"/>
+            <a:endParaRPr lang="en-US"/>
           </a:p>
         </p:txBody>
       </p:sp>
@@ -3025,7 +3388,7 @@
               <a:rPr lang="en-US" smtClean="0"/>
               <a:t>‹Nr.›</a:t>
             </a:fld>
-            <a:endParaRPr lang="en-US" dirty="0"/>
+            <a:endParaRPr lang="en-US"/>
           </a:p>
         </p:txBody>
       </p:sp>
@@ -3407,7 +3770,7 @@
           <a:lstStyle/>
           <a:p>
             <a:r>
-              <a:rPr lang="en-US" dirty="0">
+              <a:rPr lang="de-DE" noProof="1">
                 <a:solidFill>
                   <a:schemeClr val="tx1">
                     <a:lumMod val="75000"/>
@@ -3417,14 +3780,6 @@
               </a:rPr>
               <a:t>A self hosting file synchronization service</a:t>
             </a:r>
-            <a:endParaRPr lang="en-US" noProof="1">
-              <a:solidFill>
-                <a:schemeClr val="tx1">
-                  <a:lumMod val="75000"/>
-                  <a:lumOff val="25000"/>
-                </a:schemeClr>
-              </a:solidFill>
-            </a:endParaRPr>
           </a:p>
         </p:txBody>
       </p:sp>
@@ -3621,7 +3976,7 @@
           </a:lstStyle>
           <a:p>
             <a:r>
-              <a:rPr lang="en-US" dirty="0"/>
+              <a:rPr lang="en-US"/>
               <a:t>By Julian Sobott und Julien </a:t>
             </a:r>
             <a:r>
@@ -3683,7 +4038,7 @@
           <a:lstStyle/>
           <a:p>
             <a:r>
-              <a:rPr lang="en-US" dirty="0"/>
+              <a:rPr lang="de-DE" noProof="1"/>
               <a:t>Features</a:t>
             </a:r>
           </a:p>
@@ -3711,70 +4066,33 @@
           <a:lstStyle/>
           <a:p>
             <a:r>
-              <a:rPr lang="en-US" noProof="1"/>
-              <a:t>Automatische</a:t>
-            </a:r>
-            <a:r>
-              <a:rPr lang="en-US" dirty="0"/>
-              <a:t> Synchronisation</a:t>
-            </a:r>
-          </a:p>
-          <a:p>
-            <a:endParaRPr lang="en-US" dirty="0"/>
-          </a:p>
-          <a:p>
-            <a:r>
-              <a:rPr lang="en-US" dirty="0"/>
-              <a:t>Nur </a:t>
-            </a:r>
-            <a:r>
-              <a:rPr lang="en-US" dirty="0" err="1"/>
-              <a:t>ausgewählte</a:t>
-            </a:r>
-            <a:r>
-              <a:rPr lang="en-US" dirty="0"/>
-              <a:t> </a:t>
-            </a:r>
-            <a:r>
-              <a:rPr lang="en-US" dirty="0" err="1"/>
-              <a:t>Ordner</a:t>
-            </a:r>
-            <a:endParaRPr lang="en-US" dirty="0"/>
-          </a:p>
-          <a:p>
-            <a:endParaRPr lang="en-US" dirty="0"/>
-          </a:p>
-          <a:p>
-            <a:r>
-              <a:rPr lang="en-US" dirty="0" err="1"/>
-              <a:t>Daten</a:t>
-            </a:r>
-            <a:r>
-              <a:rPr lang="en-US" dirty="0"/>
-              <a:t> </a:t>
-            </a:r>
-            <a:r>
-              <a:rPr lang="en-US" dirty="0" err="1"/>
-              <a:t>liegen</a:t>
-            </a:r>
-            <a:r>
-              <a:rPr lang="en-US" dirty="0"/>
-              <a:t> auf </a:t>
-            </a:r>
-            <a:r>
-              <a:rPr lang="en-US" dirty="0" err="1"/>
-              <a:t>eigenem</a:t>
-            </a:r>
-            <a:r>
-              <a:rPr lang="en-US" dirty="0"/>
-              <a:t> Server</a:t>
+              <a:rPr lang="de-DE" noProof="1"/>
+              <a:t>Automatische Synchronisation</a:t>
+            </a:r>
+          </a:p>
+          <a:p>
+            <a:endParaRPr lang="de-DE" noProof="1"/>
+          </a:p>
+          <a:p>
+            <a:r>
+              <a:rPr lang="de-DE" noProof="1"/>
+              <a:t>Nur ausgewählte Ordner</a:t>
+            </a:r>
+          </a:p>
+          <a:p>
+            <a:endParaRPr lang="de-DE" noProof="1"/>
+          </a:p>
+          <a:p>
+            <a:r>
+              <a:rPr lang="de-DE" noProof="1"/>
+              <a:t>Daten liegen auf eigenem Server</a:t>
             </a:r>
           </a:p>
           <a:p>
             <a:pPr marL="0" indent="0">
               <a:buNone/>
             </a:pPr>
-            <a:endParaRPr lang="en-US" dirty="0"/>
+            <a:endParaRPr lang="de-DE" noProof="1"/>
           </a:p>
         </p:txBody>
       </p:sp>
@@ -3822,7 +4140,7 @@
         </p:nvSpPr>
         <p:spPr>
           <a:xfrm>
-            <a:off x="228600" y="2347970"/>
+            <a:off x="216876" y="1879047"/>
             <a:ext cx="4562856" cy="2569464"/>
           </a:xfrm>
           <a:prstGeom prst="roundRect">
@@ -3850,7 +4168,7 @@
           <a:lstStyle/>
           <a:p>
             <a:pPr algn="ctr"/>
-            <a:endParaRPr lang="de-DE" dirty="0"/>
+            <a:endParaRPr lang="de-DE"/>
           </a:p>
         </p:txBody>
       </p:sp>
@@ -3868,8 +4186,8 @@
         </p:nvSpPr>
         <p:spPr>
           <a:xfrm>
-            <a:off x="6976872" y="2347969"/>
-            <a:ext cx="4940808" cy="2569451"/>
+            <a:off x="6965148" y="1879045"/>
+            <a:ext cx="4940808" cy="4613829"/>
           </a:xfrm>
           <a:prstGeom prst="roundRect">
             <a:avLst/>
@@ -3896,7 +4214,7 @@
           <a:lstStyle/>
           <a:p>
             <a:pPr algn="ctr"/>
-            <a:endParaRPr lang="de-DE" dirty="0"/>
+            <a:endParaRPr lang="de-DE"/>
           </a:p>
         </p:txBody>
       </p:sp>
@@ -3914,7 +4232,7 @@
         </p:nvSpPr>
         <p:spPr>
           <a:xfrm>
-            <a:off x="9979152" y="2688336"/>
+            <a:off x="9967428" y="2219413"/>
             <a:ext cx="1810512" cy="1819656"/>
           </a:xfrm>
           <a:prstGeom prst="roundRect">
@@ -3943,7 +4261,7 @@
           <a:p>
             <a:pPr algn="ctr"/>
             <a:r>
-              <a:rPr lang="de-DE" dirty="0"/>
+              <a:rPr lang="de-DE"/>
               <a:t>GUI</a:t>
             </a:r>
           </a:p>
@@ -3963,7 +4281,7 @@
         </p:nvSpPr>
         <p:spPr>
           <a:xfrm>
-            <a:off x="7278624" y="2688336"/>
+            <a:off x="7266900" y="2219413"/>
             <a:ext cx="1810512" cy="1819656"/>
           </a:xfrm>
           <a:prstGeom prst="roundRect">
@@ -3992,7 +4310,7 @@
           <a:p>
             <a:pPr algn="ctr"/>
             <a:r>
-              <a:rPr lang="de-DE" dirty="0"/>
+              <a:rPr lang="de-DE"/>
               <a:t>Backend</a:t>
             </a:r>
           </a:p>
@@ -4016,7 +4334,7 @@
         </p:nvCxnSpPr>
         <p:spPr>
           <a:xfrm>
-            <a:off x="9089136" y="3598164"/>
+            <a:off x="9077412" y="3129241"/>
             <a:ext cx="890016" cy="0"/>
           </a:xfrm>
           <a:prstGeom prst="straightConnector1">
@@ -4059,7 +4377,7 @@
         </p:nvCxnSpPr>
         <p:spPr>
           <a:xfrm>
-            <a:off x="4482249" y="3598164"/>
+            <a:off x="4470525" y="3129241"/>
             <a:ext cx="2796375" cy="0"/>
           </a:xfrm>
           <a:prstGeom prst="straightConnector1">
@@ -4099,7 +4417,7 @@
         </p:nvSpPr>
         <p:spPr>
           <a:xfrm>
-            <a:off x="1773019" y="1857340"/>
+            <a:off x="1761295" y="1388417"/>
             <a:ext cx="3216925" cy="461665"/>
           </a:xfrm>
           <a:prstGeom prst="rect">
@@ -4114,10 +4432,10 @@
           <a:lstStyle/>
           <a:p>
             <a:r>
-              <a:rPr lang="de-DE" sz="2400" dirty="0"/>
+              <a:rPr lang="de-DE" sz="2400"/>
               <a:t>Server</a:t>
             </a:r>
-            <a:endParaRPr lang="de-DE" dirty="0"/>
+            <a:endParaRPr lang="de-DE"/>
           </a:p>
         </p:txBody>
       </p:sp>
@@ -4135,7 +4453,7 @@
         </p:nvSpPr>
         <p:spPr>
           <a:xfrm>
-            <a:off x="9115044" y="1818439"/>
+            <a:off x="9103320" y="1349516"/>
             <a:ext cx="1728216" cy="461665"/>
           </a:xfrm>
           <a:prstGeom prst="rect">
@@ -4150,7 +4468,7 @@
           <a:lstStyle/>
           <a:p>
             <a:r>
-              <a:rPr lang="de-DE" sz="2400" dirty="0"/>
+              <a:rPr lang="de-DE" sz="2400"/>
               <a:t>Client</a:t>
             </a:r>
           </a:p>
@@ -4170,7 +4488,7 @@
         </p:nvSpPr>
         <p:spPr>
           <a:xfrm>
-            <a:off x="2671737" y="2688336"/>
+            <a:off x="2660013" y="2219413"/>
             <a:ext cx="1810512" cy="1819656"/>
           </a:xfrm>
           <a:prstGeom prst="roundRect">
@@ -4199,7 +4517,7 @@
           <a:p>
             <a:pPr algn="ctr"/>
             <a:r>
-              <a:rPr lang="de-DE" dirty="0"/>
+              <a:rPr lang="de-DE"/>
               <a:t>Backend</a:t>
             </a:r>
           </a:p>
@@ -4219,7 +4537,7 @@
         </p:nvSpPr>
         <p:spPr>
           <a:xfrm>
-            <a:off x="4989944" y="3228832"/>
+            <a:off x="4978220" y="2713980"/>
             <a:ext cx="1858912" cy="369332"/>
           </a:xfrm>
           <a:prstGeom prst="rect">
@@ -4248,10 +4566,10 @@
           <a:p>
             <a:pPr algn="ctr"/>
             <a:r>
-              <a:rPr lang="de-DE" dirty="0" err="1"/>
+              <a:rPr lang="de-DE" err="1"/>
               <a:t>pynetworking</a:t>
             </a:r>
-            <a:endParaRPr lang="de-DE" dirty="0"/>
+            <a:endParaRPr lang="de-DE"/>
           </a:p>
         </p:txBody>
       </p:sp>
@@ -4269,7 +4587,7 @@
         </p:nvSpPr>
         <p:spPr>
           <a:xfrm>
-            <a:off x="10101255" y="3799248"/>
+            <a:off x="10089531" y="3330325"/>
             <a:ext cx="1611841" cy="369332"/>
           </a:xfrm>
           <a:prstGeom prst="rect">
@@ -4298,10 +4616,10 @@
           <a:p>
             <a:pPr algn="ctr"/>
             <a:r>
-              <a:rPr lang="de-DE" dirty="0" err="1"/>
+              <a:rPr lang="de-DE" err="1"/>
               <a:t>kivy</a:t>
             </a:r>
-            <a:endParaRPr lang="de-DE" dirty="0"/>
+            <a:endParaRPr lang="de-DE"/>
           </a:p>
         </p:txBody>
       </p:sp>
@@ -4319,7 +4637,7 @@
         </p:nvSpPr>
         <p:spPr>
           <a:xfrm>
-            <a:off x="7359579" y="3799248"/>
+            <a:off x="7347855" y="3330325"/>
             <a:ext cx="1659453" cy="369332"/>
           </a:xfrm>
           <a:prstGeom prst="rect">
@@ -4348,23 +4666,51 @@
           <a:p>
             <a:pPr algn="ctr"/>
             <a:r>
-              <a:rPr lang="de-DE" dirty="0"/>
-              <a:t>Watchdog, </a:t>
-            </a:r>
-            <a:r>
-              <a:rPr lang="de-DE" dirty="0" err="1"/>
-              <a:t>json</a:t>
-            </a:r>
-            <a:endParaRPr lang="de-DE" dirty="0"/>
-          </a:p>
-        </p:txBody>
-      </p:sp>
-      <p:sp>
-        <p:nvSpPr>
-          <p:cNvPr id="22" name="Rechteck 21">
-            <a:extLst>
-              <a:ext uri="{FF2B5EF4-FFF2-40B4-BE49-F238E27FC236}">
-                <a16:creationId xmlns:a16="http://schemas.microsoft.com/office/drawing/2014/main" id="{F561DDA2-B9BE-49B5-8BF5-429889AF057D}"/>
+              <a:rPr lang="de-DE"/>
+              <a:t>Watchdog</a:t>
+            </a:r>
+          </a:p>
+        </p:txBody>
+      </p:sp>
+      <p:sp>
+        <p:nvSpPr>
+          <p:cNvPr id="24" name="Titel 1">
+            <a:extLst>
+              <a:ext uri="{FF2B5EF4-FFF2-40B4-BE49-F238E27FC236}">
+                <a16:creationId xmlns:a16="http://schemas.microsoft.com/office/drawing/2014/main" id="{51F92CD4-29ED-42FD-BDD3-1EF45490F132}"/>
+              </a:ext>
+            </a:extLst>
+          </p:cNvPr>
+          <p:cNvSpPr>
+            <a:spLocks noGrp="1"/>
+          </p:cNvSpPr>
+          <p:nvPr>
+            <p:ph type="title"/>
+          </p:nvPr>
+        </p:nvSpPr>
+        <p:spPr>
+          <a:xfrm>
+            <a:off x="838200" y="365125"/>
+            <a:ext cx="10515600" cy="1325563"/>
+          </a:xfrm>
+        </p:spPr>
+        <p:txBody>
+          <a:bodyPr/>
+          <a:lstStyle/>
+          <a:p>
+            <a:r>
+              <a:rPr lang="de-DE" noProof="1"/>
+              <a:t>Struktur</a:t>
+            </a:r>
+          </a:p>
+        </p:txBody>
+      </p:sp>
+      <p:sp>
+        <p:nvSpPr>
+          <p:cNvPr id="18" name="Rechteck: abgerundete Ecken 17">
+            <a:extLst>
+              <a:ext uri="{FF2B5EF4-FFF2-40B4-BE49-F238E27FC236}">
+                <a16:creationId xmlns:a16="http://schemas.microsoft.com/office/drawing/2014/main" id="{E03EF504-9AAC-4C96-94C1-1FD42BB5D946}"/>
               </a:ext>
             </a:extLst>
           </p:cNvPr>
@@ -4373,7 +4719,56 @@
         </p:nvSpPr>
         <p:spPr>
           <a:xfrm>
-            <a:off x="2807382" y="3799248"/>
+            <a:off x="390612" y="2219413"/>
+            <a:ext cx="1810512" cy="1819656"/>
+          </a:xfrm>
+          <a:prstGeom prst="roundRect">
+            <a:avLst/>
+          </a:prstGeom>
+        </p:spPr>
+        <p:style>
+          <a:lnRef idx="2">
+            <a:schemeClr val="accent4">
+              <a:shade val="50000"/>
+            </a:schemeClr>
+          </a:lnRef>
+          <a:fillRef idx="1">
+            <a:schemeClr val="accent4"/>
+          </a:fillRef>
+          <a:effectRef idx="0">
+            <a:schemeClr val="accent4"/>
+          </a:effectRef>
+          <a:fontRef idx="minor">
+            <a:schemeClr val="lt1"/>
+          </a:fontRef>
+        </p:style>
+        <p:txBody>
+          <a:bodyPr rtlCol="0" anchor="ctr"/>
+          <a:lstStyle/>
+          <a:p>
+            <a:pPr algn="ctr"/>
+            <a:r>
+              <a:rPr lang="de-DE"/>
+              <a:t>Data</a:t>
+            </a:r>
+          </a:p>
+        </p:txBody>
+      </p:sp>
+      <p:sp>
+        <p:nvSpPr>
+          <p:cNvPr id="22" name="Rechteck 21">
+            <a:extLst>
+              <a:ext uri="{FF2B5EF4-FFF2-40B4-BE49-F238E27FC236}">
+                <a16:creationId xmlns:a16="http://schemas.microsoft.com/office/drawing/2014/main" id="{F561DDA2-B9BE-49B5-8BF5-429889AF057D}"/>
+              </a:ext>
+            </a:extLst>
+          </p:cNvPr>
+          <p:cNvSpPr/>
+          <p:nvPr/>
+        </p:nvSpPr>
+        <p:spPr>
+          <a:xfrm>
+            <a:off x="526257" y="3389613"/>
             <a:ext cx="1539221" cy="369332"/>
           </a:xfrm>
           <a:prstGeom prst="rect">
@@ -4402,55 +4797,206 @@
           <a:p>
             <a:pPr algn="ctr"/>
             <a:r>
-              <a:rPr lang="de-DE" dirty="0" err="1"/>
+              <a:rPr lang="de-DE" err="1"/>
               <a:t>sqlite</a:t>
             </a:r>
             <a:r>
-              <a:rPr lang="de-DE" dirty="0"/>
+              <a:rPr lang="de-DE"/>
               <a:t>, </a:t>
             </a:r>
             <a:r>
-              <a:rPr lang="de-DE" dirty="0" err="1"/>
+              <a:rPr lang="de-DE" err="1"/>
               <a:t>json</a:t>
             </a:r>
-            <a:endParaRPr lang="de-DE" dirty="0"/>
-          </a:p>
-        </p:txBody>
-      </p:sp>
-      <p:sp>
-        <p:nvSpPr>
-          <p:cNvPr id="24" name="Titel 1">
-            <a:extLst>
-              <a:ext uri="{FF2B5EF4-FFF2-40B4-BE49-F238E27FC236}">
-                <a16:creationId xmlns:a16="http://schemas.microsoft.com/office/drawing/2014/main" id="{51F92CD4-29ED-42FD-BDD3-1EF45490F132}"/>
-              </a:ext>
-            </a:extLst>
-          </p:cNvPr>
-          <p:cNvSpPr>
-            <a:spLocks noGrp="1"/>
-          </p:cNvSpPr>
-          <p:nvPr>
-            <p:ph type="title"/>
-          </p:nvPr>
-        </p:nvSpPr>
+            <a:endParaRPr lang="de-DE"/>
+          </a:p>
+        </p:txBody>
+      </p:sp>
+      <p:cxnSp>
+        <p:nvCxnSpPr>
+          <p:cNvPr id="23" name="Gerade Verbindung mit Pfeil 22">
+            <a:extLst>
+              <a:ext uri="{FF2B5EF4-FFF2-40B4-BE49-F238E27FC236}">
+                <a16:creationId xmlns:a16="http://schemas.microsoft.com/office/drawing/2014/main" id="{14E3604F-46EC-4592-BE87-2E429393F8ED}"/>
+              </a:ext>
+            </a:extLst>
+          </p:cNvPr>
+          <p:cNvCxnSpPr>
+            <a:cxnSpLocks/>
+          </p:cNvCxnSpPr>
+          <p:nvPr/>
+        </p:nvCxnSpPr>
         <p:spPr>
           <a:xfrm>
-            <a:off x="838200" y="365125"/>
-            <a:ext cx="10515600" cy="1325563"/>
+            <a:off x="2201124" y="3187762"/>
+            <a:ext cx="458889" cy="0"/>
           </a:xfrm>
+          <a:prstGeom prst="straightConnector1">
+            <a:avLst/>
+          </a:prstGeom>
+          <a:ln w="50800">
+            <a:headEnd type="triangle"/>
+            <a:tailEnd type="triangle"/>
+          </a:ln>
         </p:spPr>
-        <p:txBody>
-          <a:bodyPr/>
-          <a:lstStyle/>
-          <a:p>
-            <a:r>
-              <a:rPr lang="en-US" dirty="0" err="1"/>
-              <a:t>Struktur</a:t>
-            </a:r>
-            <a:endParaRPr lang="en-US" dirty="0"/>
-          </a:p>
-        </p:txBody>
-      </p:sp>
+        <p:style>
+          <a:lnRef idx="1">
+            <a:schemeClr val="accent1"/>
+          </a:lnRef>
+          <a:fillRef idx="0">
+            <a:schemeClr val="accent1"/>
+          </a:fillRef>
+          <a:effectRef idx="0">
+            <a:schemeClr val="accent1"/>
+          </a:effectRef>
+          <a:fontRef idx="minor">
+            <a:schemeClr val="tx1"/>
+          </a:fontRef>
+        </p:style>
+      </p:cxnSp>
+      <p:sp>
+        <p:nvSpPr>
+          <p:cNvPr id="28" name="Rechteck: abgerundete Ecken 27">
+            <a:extLst>
+              <a:ext uri="{FF2B5EF4-FFF2-40B4-BE49-F238E27FC236}">
+                <a16:creationId xmlns:a16="http://schemas.microsoft.com/office/drawing/2014/main" id="{A11D9AE3-E60A-4AF8-8061-4EE1A2495045}"/>
+              </a:ext>
+            </a:extLst>
+          </p:cNvPr>
+          <p:cNvSpPr/>
+          <p:nvPr/>
+        </p:nvSpPr>
+        <p:spPr>
+          <a:xfrm>
+            <a:off x="7266900" y="4567794"/>
+            <a:ext cx="1810512" cy="1819656"/>
+          </a:xfrm>
+          <a:prstGeom prst="roundRect">
+            <a:avLst/>
+          </a:prstGeom>
+        </p:spPr>
+        <p:style>
+          <a:lnRef idx="2">
+            <a:schemeClr val="accent4">
+              <a:shade val="50000"/>
+            </a:schemeClr>
+          </a:lnRef>
+          <a:fillRef idx="1">
+            <a:schemeClr val="accent4"/>
+          </a:fillRef>
+          <a:effectRef idx="0">
+            <a:schemeClr val="accent4"/>
+          </a:effectRef>
+          <a:fontRef idx="minor">
+            <a:schemeClr val="lt1"/>
+          </a:fontRef>
+        </p:style>
+        <p:txBody>
+          <a:bodyPr rtlCol="0" anchor="ctr"/>
+          <a:lstStyle/>
+          <a:p>
+            <a:pPr algn="ctr"/>
+            <a:r>
+              <a:rPr lang="de-DE"/>
+              <a:t>Data</a:t>
+            </a:r>
+          </a:p>
+        </p:txBody>
+      </p:sp>
+      <p:sp>
+        <p:nvSpPr>
+          <p:cNvPr id="29" name="Rechteck 28">
+            <a:extLst>
+              <a:ext uri="{FF2B5EF4-FFF2-40B4-BE49-F238E27FC236}">
+                <a16:creationId xmlns:a16="http://schemas.microsoft.com/office/drawing/2014/main" id="{52874575-DC0F-4862-B1ED-DBFC7B456964}"/>
+              </a:ext>
+            </a:extLst>
+          </p:cNvPr>
+          <p:cNvSpPr/>
+          <p:nvPr/>
+        </p:nvSpPr>
+        <p:spPr>
+          <a:xfrm>
+            <a:off x="7402545" y="5737994"/>
+            <a:ext cx="1539221" cy="369332"/>
+          </a:xfrm>
+          <a:prstGeom prst="rect">
+            <a:avLst/>
+          </a:prstGeom>
+        </p:spPr>
+        <p:style>
+          <a:lnRef idx="2">
+            <a:schemeClr val="accent6">
+              <a:shade val="50000"/>
+            </a:schemeClr>
+          </a:lnRef>
+          <a:fillRef idx="1">
+            <a:schemeClr val="accent6"/>
+          </a:fillRef>
+          <a:effectRef idx="0">
+            <a:schemeClr val="accent6"/>
+          </a:effectRef>
+          <a:fontRef idx="minor">
+            <a:schemeClr val="lt1"/>
+          </a:fontRef>
+        </p:style>
+        <p:txBody>
+          <a:bodyPr rtlCol="0" anchor="ctr"/>
+          <a:lstStyle/>
+          <a:p>
+            <a:pPr algn="ctr"/>
+            <a:r>
+              <a:rPr lang="de-DE" err="1"/>
+              <a:t>json</a:t>
+            </a:r>
+            <a:endParaRPr lang="de-DE"/>
+          </a:p>
+        </p:txBody>
+      </p:sp>
+      <p:cxnSp>
+        <p:nvCxnSpPr>
+          <p:cNvPr id="30" name="Gerade Verbindung mit Pfeil 29">
+            <a:extLst>
+              <a:ext uri="{FF2B5EF4-FFF2-40B4-BE49-F238E27FC236}">
+                <a16:creationId xmlns:a16="http://schemas.microsoft.com/office/drawing/2014/main" id="{DA8A5834-72D2-4053-89D7-2FF6B0C5AE1F}"/>
+              </a:ext>
+            </a:extLst>
+          </p:cNvPr>
+          <p:cNvCxnSpPr>
+            <a:cxnSpLocks/>
+            <a:stCxn id="28" idx="0"/>
+            <a:endCxn id="7" idx="2"/>
+          </p:cNvCxnSpPr>
+          <p:nvPr/>
+        </p:nvCxnSpPr>
+        <p:spPr>
+          <a:xfrm flipV="1">
+            <a:off x="8172156" y="4039069"/>
+            <a:ext cx="0" cy="528725"/>
+          </a:xfrm>
+          <a:prstGeom prst="straightConnector1">
+            <a:avLst/>
+          </a:prstGeom>
+          <a:ln w="50800">
+            <a:headEnd type="triangle"/>
+            <a:tailEnd type="triangle"/>
+          </a:ln>
+        </p:spPr>
+        <p:style>
+          <a:lnRef idx="1">
+            <a:schemeClr val="accent1"/>
+          </a:lnRef>
+          <a:fillRef idx="0">
+            <a:schemeClr val="accent1"/>
+          </a:fillRef>
+          <a:effectRef idx="0">
+            <a:schemeClr val="accent1"/>
+          </a:effectRef>
+          <a:fontRef idx="minor">
+            <a:schemeClr val="tx1"/>
+          </a:fontRef>
+        </p:style>
+      </p:cxnSp>
     </p:spTree>
     <p:extLst>
       <p:ext uri="{BB962C8B-B14F-4D97-AF65-F5344CB8AC3E}">
@@ -4586,6 +5132,76 @@
                                   </p:childTnLst>
                                 </p:cTn>
                               </p:par>
+                              <p:par>
+                                <p:cTn id="14" presetID="10" presetClass="entr" presetSubtype="0" fill="hold" grpId="0" nodeType="withEffect">
+                                  <p:stCondLst>
+                                    <p:cond delay="0"/>
+                                  </p:stCondLst>
+                                  <p:childTnLst>
+                                    <p:set>
+                                      <p:cBhvr>
+                                        <p:cTn id="15" dur="1" fill="hold">
+                                          <p:stCondLst>
+                                            <p:cond delay="0"/>
+                                          </p:stCondLst>
+                                        </p:cTn>
+                                        <p:tgtEl>
+                                          <p:spTgt spid="18"/>
+                                        </p:tgtEl>
+                                        <p:attrNameLst>
+                                          <p:attrName>style.visibility</p:attrName>
+                                        </p:attrNameLst>
+                                      </p:cBhvr>
+                                      <p:to>
+                                        <p:strVal val="visible"/>
+                                      </p:to>
+                                    </p:set>
+                                    <p:animEffect transition="in" filter="fade">
+                                      <p:cBhvr>
+                                        <p:cTn id="16" dur="500"/>
+                                        <p:tgtEl>
+                                          <p:spTgt spid="18"/>
+                                        </p:tgtEl>
+                                      </p:cBhvr>
+                                    </p:animEffect>
+                                  </p:childTnLst>
+                                </p:cTn>
+                              </p:par>
+                              <p:par>
+                                <p:cTn id="17" presetID="10" presetClass="entr" presetSubtype="0" fill="hold" grpId="0" nodeType="withEffect">
+                                  <p:stCondLst>
+                                    <p:cond delay="0"/>
+                                  </p:stCondLst>
+                                  <p:childTnLst>
+                                    <p:set>
+                                      <p:cBhvr>
+                                        <p:cTn id="18" dur="1" fill="hold">
+                                          <p:stCondLst>
+                                            <p:cond delay="0"/>
+                                          </p:stCondLst>
+                                        </p:cTn>
+                                        <p:tgtEl>
+                                          <p:spTgt spid="28"/>
+                                        </p:tgtEl>
+                                        <p:attrNameLst>
+                                          <p:attrName>style.visibility</p:attrName>
+                                        </p:attrNameLst>
+                                      </p:cBhvr>
+                                      <p:to>
+                                        <p:strVal val="visible"/>
+                                      </p:to>
+                                    </p:set>
+                                    <p:animEffect transition="in" filter="fade">
+                                      <p:cBhvr>
+                                        <p:cTn id="19" dur="500"/>
+                                        <p:tgtEl>
+                                          <p:spTgt spid="28"/>
+                                        </p:tgtEl>
+                                      </p:cBhvr>
+                                    </p:animEffect>
+                                  </p:childTnLst>
+                                </p:cTn>
+                              </p:par>
                             </p:childTnLst>
                           </p:cTn>
                         </p:par>
@@ -4593,26 +5209,26 @@
                     </p:cTn>
                   </p:par>
                   <p:par>
-                    <p:cTn id="14" fill="hold">
+                    <p:cTn id="20" fill="hold">
                       <p:stCondLst>
                         <p:cond delay="indefinite"/>
                       </p:stCondLst>
                       <p:childTnLst>
                         <p:par>
-                          <p:cTn id="15" fill="hold">
+                          <p:cTn id="21" fill="hold">
                             <p:stCondLst>
                               <p:cond delay="0"/>
                             </p:stCondLst>
                             <p:childTnLst>
                               <p:par>
-                                <p:cTn id="16" presetID="10" presetClass="entr" presetSubtype="0" fill="hold" nodeType="clickEffect">
+                                <p:cTn id="22" presetID="10" presetClass="entr" presetSubtype="0" fill="hold" nodeType="clickEffect">
                                   <p:stCondLst>
                                     <p:cond delay="0"/>
                                   </p:stCondLst>
                                   <p:childTnLst>
                                     <p:set>
                                       <p:cBhvr>
-                                        <p:cTn id="17" dur="1" fill="hold">
+                                        <p:cTn id="23" dur="1" fill="hold">
                                           <p:stCondLst>
                                             <p:cond delay="0"/>
                                           </p:stCondLst>
@@ -4630,7 +5246,7 @@
                                     </p:set>
                                     <p:animEffect transition="in" filter="fade">
                                       <p:cBhvr>
-                                        <p:cTn id="18" dur="500"/>
+                                        <p:cTn id="24" dur="500"/>
                                         <p:tgtEl>
                                           <p:spTgt spid="13"/>
                                         </p:tgtEl>
@@ -4640,14 +5256,14 @@
                                 </p:cTn>
                               </p:par>
                               <p:par>
-                                <p:cTn id="19" presetID="10" presetClass="entr" presetSubtype="0" fill="hold" nodeType="withEffect">
+                                <p:cTn id="25" presetID="10" presetClass="entr" presetSubtype="0" fill="hold" nodeType="withEffect">
                                   <p:stCondLst>
                                     <p:cond delay="0"/>
                                   </p:stCondLst>
                                   <p:childTnLst>
                                     <p:set>
                                       <p:cBhvr>
-                                        <p:cTn id="20" dur="1" fill="hold">
+                                        <p:cTn id="26" dur="1" fill="hold">
                                           <p:stCondLst>
                                             <p:cond delay="0"/>
                                           </p:stCondLst>
@@ -4665,9 +5281,79 @@
                                     </p:set>
                                     <p:animEffect transition="in" filter="fade">
                                       <p:cBhvr>
-                                        <p:cTn id="21" dur="500"/>
+                                        <p:cTn id="27" dur="500"/>
                                         <p:tgtEl>
                                           <p:spTgt spid="9"/>
+                                        </p:tgtEl>
+                                      </p:cBhvr>
+                                    </p:animEffect>
+                                  </p:childTnLst>
+                                </p:cTn>
+                              </p:par>
+                              <p:par>
+                                <p:cTn id="28" presetID="10" presetClass="entr" presetSubtype="0" fill="hold" nodeType="withEffect">
+                                  <p:stCondLst>
+                                    <p:cond delay="0"/>
+                                  </p:stCondLst>
+                                  <p:childTnLst>
+                                    <p:set>
+                                      <p:cBhvr>
+                                        <p:cTn id="29" dur="1" fill="hold">
+                                          <p:stCondLst>
+                                            <p:cond delay="0"/>
+                                          </p:stCondLst>
+                                        </p:cTn>
+                                        <p:tgtEl>
+                                          <p:spTgt spid="23"/>
+                                        </p:tgtEl>
+                                        <p:attrNameLst>
+                                          <p:attrName>style.visibility</p:attrName>
+                                        </p:attrNameLst>
+                                      </p:cBhvr>
+                                      <p:to>
+                                        <p:strVal val="visible"/>
+                                      </p:to>
+                                    </p:set>
+                                    <p:animEffect transition="in" filter="fade">
+                                      <p:cBhvr>
+                                        <p:cTn id="30" dur="500"/>
+                                        <p:tgtEl>
+                                          <p:spTgt spid="23"/>
+                                        </p:tgtEl>
+                                      </p:cBhvr>
+                                    </p:animEffect>
+                                  </p:childTnLst>
+                                </p:cTn>
+                              </p:par>
+                              <p:par>
+                                <p:cTn id="31" presetID="10" presetClass="entr" presetSubtype="0" fill="hold" nodeType="withEffect">
+                                  <p:stCondLst>
+                                    <p:cond delay="0"/>
+                                  </p:stCondLst>
+                                  <p:childTnLst>
+                                    <p:set>
+                                      <p:cBhvr>
+                                        <p:cTn id="32" dur="1" fill="hold">
+                                          <p:stCondLst>
+                                            <p:cond delay="0"/>
+                                          </p:stCondLst>
+                                        </p:cTn>
+                                        <p:tgtEl>
+                                          <p:spTgt spid="30"/>
+                                        </p:tgtEl>
+                                        <p:attrNameLst>
+                                          <p:attrName>style.visibility</p:attrName>
+                                        </p:attrNameLst>
+                                      </p:cBhvr>
+                                      <p:to>
+                                        <p:strVal val="visible"/>
+                                      </p:to>
+                                    </p:set>
+                                    <p:animEffect transition="in" filter="fade">
+                                      <p:cBhvr>
+                                        <p:cTn id="33" dur="500"/>
+                                        <p:tgtEl>
+                                          <p:spTgt spid="30"/>
                                         </p:tgtEl>
                                       </p:cBhvr>
                                     </p:animEffect>
@@ -4681,26 +5367,26 @@
                     </p:cTn>
                   </p:par>
                   <p:par>
-                    <p:cTn id="22" fill="hold">
+                    <p:cTn id="34" fill="hold">
                       <p:stCondLst>
                         <p:cond delay="indefinite"/>
                       </p:stCondLst>
                       <p:childTnLst>
                         <p:par>
-                          <p:cTn id="23" fill="hold">
+                          <p:cTn id="35" fill="hold">
                             <p:stCondLst>
                               <p:cond delay="0"/>
                             </p:stCondLst>
                             <p:childTnLst>
                               <p:par>
-                                <p:cTn id="24" presetID="10" presetClass="entr" presetSubtype="0" fill="hold" grpId="0" nodeType="clickEffect">
+                                <p:cTn id="36" presetID="10" presetClass="entr" presetSubtype="0" fill="hold" grpId="0" nodeType="clickEffect">
                                   <p:stCondLst>
                                     <p:cond delay="0"/>
                                   </p:stCondLst>
                                   <p:childTnLst>
                                     <p:set>
                                       <p:cBhvr>
-                                        <p:cTn id="25" dur="1" fill="hold">
+                                        <p:cTn id="37" dur="1" fill="hold">
                                           <p:stCondLst>
                                             <p:cond delay="0"/>
                                           </p:stCondLst>
@@ -4718,7 +5404,7 @@
                                     </p:set>
                                     <p:animEffect transition="in" filter="fade">
                                       <p:cBhvr>
-                                        <p:cTn id="26" dur="500"/>
+                                        <p:cTn id="38" dur="500"/>
                                         <p:tgtEl>
                                           <p:spTgt spid="22"/>
                                         </p:tgtEl>
@@ -4728,14 +5414,14 @@
                                 </p:cTn>
                               </p:par>
                               <p:par>
-                                <p:cTn id="27" presetID="10" presetClass="entr" presetSubtype="0" fill="hold" grpId="0" nodeType="withEffect">
+                                <p:cTn id="39" presetID="10" presetClass="entr" presetSubtype="0" fill="hold" grpId="0" nodeType="withEffect">
                                   <p:stCondLst>
                                     <p:cond delay="0"/>
                                   </p:stCondLst>
                                   <p:childTnLst>
                                     <p:set>
                                       <p:cBhvr>
-                                        <p:cTn id="28" dur="1" fill="hold">
+                                        <p:cTn id="40" dur="1" fill="hold">
                                           <p:stCondLst>
                                             <p:cond delay="0"/>
                                           </p:stCondLst>
@@ -4753,7 +5439,7 @@
                                     </p:set>
                                     <p:animEffect transition="in" filter="fade">
                                       <p:cBhvr>
-                                        <p:cTn id="29" dur="500"/>
+                                        <p:cTn id="41" dur="500"/>
                                         <p:tgtEl>
                                           <p:spTgt spid="19"/>
                                         </p:tgtEl>
@@ -4763,14 +5449,14 @@
                                 </p:cTn>
                               </p:par>
                               <p:par>
-                                <p:cTn id="30" presetID="10" presetClass="entr" presetSubtype="0" fill="hold" grpId="0" nodeType="withEffect">
+                                <p:cTn id="42" presetID="10" presetClass="entr" presetSubtype="0" fill="hold" grpId="0" nodeType="withEffect">
                                   <p:stCondLst>
                                     <p:cond delay="0"/>
                                   </p:stCondLst>
                                   <p:childTnLst>
                                     <p:set>
                                       <p:cBhvr>
-                                        <p:cTn id="31" dur="1" fill="hold">
+                                        <p:cTn id="43" dur="1" fill="hold">
                                           <p:stCondLst>
                                             <p:cond delay="0"/>
                                           </p:stCondLst>
@@ -4788,7 +5474,7 @@
                                     </p:set>
                                     <p:animEffect transition="in" filter="fade">
                                       <p:cBhvr>
-                                        <p:cTn id="32" dur="500"/>
+                                        <p:cTn id="44" dur="500"/>
                                         <p:tgtEl>
                                           <p:spTgt spid="21"/>
                                         </p:tgtEl>
@@ -4798,14 +5484,14 @@
                                 </p:cTn>
                               </p:par>
                               <p:par>
-                                <p:cTn id="33" presetID="10" presetClass="entr" presetSubtype="0" fill="hold" grpId="0" nodeType="withEffect">
+                                <p:cTn id="45" presetID="10" presetClass="entr" presetSubtype="0" fill="hold" grpId="0" nodeType="withEffect">
                                   <p:stCondLst>
                                     <p:cond delay="0"/>
                                   </p:stCondLst>
                                   <p:childTnLst>
                                     <p:set>
                                       <p:cBhvr>
-                                        <p:cTn id="34" dur="1" fill="hold">
+                                        <p:cTn id="46" dur="1" fill="hold">
                                           <p:stCondLst>
                                             <p:cond delay="0"/>
                                           </p:stCondLst>
@@ -4823,9 +5509,44 @@
                                     </p:set>
                                     <p:animEffect transition="in" filter="fade">
                                       <p:cBhvr>
-                                        <p:cTn id="35" dur="500"/>
+                                        <p:cTn id="47" dur="500"/>
                                         <p:tgtEl>
                                           <p:spTgt spid="20"/>
+                                        </p:tgtEl>
+                                      </p:cBhvr>
+                                    </p:animEffect>
+                                  </p:childTnLst>
+                                </p:cTn>
+                              </p:par>
+                              <p:par>
+                                <p:cTn id="48" presetID="10" presetClass="entr" presetSubtype="0" fill="hold" grpId="0" nodeType="withEffect">
+                                  <p:stCondLst>
+                                    <p:cond delay="0"/>
+                                  </p:stCondLst>
+                                  <p:childTnLst>
+                                    <p:set>
+                                      <p:cBhvr>
+                                        <p:cTn id="49" dur="1" fill="hold">
+                                          <p:stCondLst>
+                                            <p:cond delay="0"/>
+                                          </p:stCondLst>
+                                        </p:cTn>
+                                        <p:tgtEl>
+                                          <p:spTgt spid="29"/>
+                                        </p:tgtEl>
+                                        <p:attrNameLst>
+                                          <p:attrName>style.visibility</p:attrName>
+                                        </p:attrNameLst>
+                                      </p:cBhvr>
+                                      <p:to>
+                                        <p:strVal val="visible"/>
+                                      </p:to>
+                                    </p:set>
+                                    <p:animEffect transition="in" filter="fade">
+                                      <p:cBhvr>
+                                        <p:cTn id="50" dur="500"/>
+                                        <p:tgtEl>
+                                          <p:spTgt spid="29"/>
                                         </p:tgtEl>
                                       </p:cBhvr>
                                     </p:animEffect>
@@ -4866,7 +5587,10 @@
       <p:bldP spid="19" grpId="0" animBg="1"/>
       <p:bldP spid="20" grpId="0" animBg="1"/>
       <p:bldP spid="21" grpId="0" animBg="1"/>
+      <p:bldP spid="18" grpId="0" animBg="1"/>
       <p:bldP spid="22" grpId="0" animBg="1"/>
+      <p:bldP spid="28" grpId="0" animBg="1"/>
+      <p:bldP spid="29" grpId="0" animBg="1"/>
     </p:bldLst>
   </p:timing>
 </p:sld>
@@ -4894,6 +5618,122 @@
           <p:cNvPr id="2" name="Titel 1">
             <a:extLst>
               <a:ext uri="{FF2B5EF4-FFF2-40B4-BE49-F238E27FC236}">
+                <a16:creationId xmlns:a16="http://schemas.microsoft.com/office/drawing/2014/main" id="{CEF8FFEA-FB82-4D6C-A81C-AFB3C3167B11}"/>
+              </a:ext>
+            </a:extLst>
+          </p:cNvPr>
+          <p:cNvSpPr>
+            <a:spLocks noGrp="1"/>
+          </p:cNvSpPr>
+          <p:nvPr>
+            <p:ph type="title"/>
+          </p:nvPr>
+        </p:nvSpPr>
+        <p:spPr/>
+        <p:txBody>
+          <a:bodyPr/>
+          <a:lstStyle/>
+          <a:p>
+            <a:r>
+              <a:rPr lang="de-DE"/>
+              <a:t>Schwierigkeiten</a:t>
+            </a:r>
+          </a:p>
+        </p:txBody>
+      </p:sp>
+      <p:sp>
+        <p:nvSpPr>
+          <p:cNvPr id="3" name="Inhaltsplatzhalter 2">
+            <a:extLst>
+              <a:ext uri="{FF2B5EF4-FFF2-40B4-BE49-F238E27FC236}">
+                <a16:creationId xmlns:a16="http://schemas.microsoft.com/office/drawing/2014/main" id="{E2A6B2CF-87F6-4D9D-BCF5-7EE7E9B08CFD}"/>
+              </a:ext>
+            </a:extLst>
+          </p:cNvPr>
+          <p:cNvSpPr>
+            <a:spLocks noGrp="1"/>
+          </p:cNvSpPr>
+          <p:nvPr>
+            <p:ph idx="1"/>
+          </p:nvPr>
+        </p:nvSpPr>
+        <p:spPr/>
+        <p:txBody>
+          <a:bodyPr/>
+          <a:lstStyle/>
+          <a:p>
+            <a:r>
+              <a:rPr lang="de-DE"/>
+              <a:t>Multiplattform Support</a:t>
+            </a:r>
+          </a:p>
+          <a:p>
+            <a:r>
+              <a:rPr lang="de-DE"/>
+              <a:t>Pynetworking Bibliothek</a:t>
+            </a:r>
+          </a:p>
+          <a:p>
+            <a:r>
+              <a:rPr lang="de-DE"/>
+              <a:t>Änderungen mergen</a:t>
+            </a:r>
+          </a:p>
+          <a:p>
+            <a:r>
+              <a:rPr lang="de-DE"/>
+              <a:t>Unterschiedliche Wissensstände</a:t>
+            </a:r>
+          </a:p>
+          <a:p>
+            <a:pPr marL="0" indent="0">
+              <a:buNone/>
+            </a:pPr>
+            <a:endParaRPr lang="de-DE"/>
+          </a:p>
+          <a:p>
+            <a:endParaRPr lang="de-DE"/>
+          </a:p>
+          <a:p>
+            <a:endParaRPr lang="de-DE"/>
+          </a:p>
+        </p:txBody>
+      </p:sp>
+    </p:spTree>
+    <p:extLst>
+      <p:ext uri="{BB962C8B-B14F-4D97-AF65-F5344CB8AC3E}">
+        <p14:creationId xmlns:p14="http://schemas.microsoft.com/office/powerpoint/2010/main" val="1998419329"/>
+      </p:ext>
+    </p:extLst>
+  </p:cSld>
+  <p:clrMapOvr>
+    <a:masterClrMapping/>
+  </p:clrMapOvr>
+</p:sld>
+</file>
+
+<file path=ppt/slides/slide5.xml><?xml version="1.0" encoding="utf-8"?>
+<p:sld xmlns:a="http://schemas.openxmlformats.org/drawingml/2006/main" xmlns:r="http://schemas.openxmlformats.org/officeDocument/2006/relationships" xmlns:p="http://schemas.openxmlformats.org/presentationml/2006/main">
+  <p:cSld>
+    <p:spTree>
+      <p:nvGrpSpPr>
+        <p:cNvPr id="1" name=""/>
+        <p:cNvGrpSpPr/>
+        <p:nvPr/>
+      </p:nvGrpSpPr>
+      <p:grpSpPr>
+        <a:xfrm>
+          <a:off x="0" y="0"/>
+          <a:ext cx="0" cy="0"/>
+          <a:chOff x="0" y="0"/>
+          <a:chExt cx="0" cy="0"/>
+        </a:xfrm>
+      </p:grpSpPr>
+      <p:sp>
+        <p:nvSpPr>
+          <p:cNvPr id="2" name="Titel 1">
+            <a:extLst>
+              <a:ext uri="{FF2B5EF4-FFF2-40B4-BE49-F238E27FC236}">
                 <a16:creationId xmlns:a16="http://schemas.microsoft.com/office/drawing/2014/main" id="{BF68929E-11D5-4A34-8333-85F1750BF3CF}"/>
               </a:ext>
             </a:extLst>
@@ -4911,7 +5751,7 @@
           <a:lstStyle/>
           <a:p>
             <a:r>
-              <a:rPr lang="de-DE" dirty="0"/>
+              <a:rPr lang="de-DE" noProof="1"/>
               <a:t>Links</a:t>
             </a:r>
           </a:p>
@@ -4939,71 +5779,51 @@
           <a:lstStyle/>
           <a:p>
             <a:r>
-              <a:rPr lang="de-DE" dirty="0"/>
-              <a:t>Code </a:t>
-            </a:r>
-            <a:r>
-              <a:rPr lang="de-DE" dirty="0" err="1"/>
-              <a:t>OpenDrive</a:t>
-            </a:r>
-            <a:r>
-              <a:rPr lang="de-DE" dirty="0"/>
-              <a:t>: </a:t>
-            </a:r>
-            <a:r>
-              <a:rPr lang="de-DE" dirty="0">
+              <a:rPr lang="de-DE" noProof="1"/>
+              <a:t>Code OpenDrive: </a:t>
+            </a:r>
+            <a:r>
+              <a:rPr lang="de-DE" noProof="1">
                 <a:hlinkClick r:id="rId2"/>
               </a:rPr>
               <a:t>https://github.com/JulianSobott/OpenDrive</a:t>
             </a:r>
-            <a:endParaRPr lang="de-DE" dirty="0"/>
-          </a:p>
-          <a:p>
-            <a:r>
-              <a:rPr lang="de-DE" dirty="0" err="1"/>
-              <a:t>Documentation</a:t>
-            </a:r>
-            <a:r>
-              <a:rPr lang="de-DE" dirty="0"/>
-              <a:t>:  </a:t>
-            </a:r>
-            <a:r>
-              <a:rPr lang="de-DE" dirty="0">
+            <a:endParaRPr lang="de-DE" noProof="1"/>
+          </a:p>
+          <a:p>
+            <a:r>
+              <a:rPr lang="de-DE" noProof="1"/>
+              <a:t>Documentation:  </a:t>
+            </a:r>
+            <a:r>
+              <a:rPr lang="de-DE" noProof="1">
                 <a:hlinkClick r:id="rId3"/>
               </a:rPr>
               <a:t>https://opendrive.readthedocs.io/en/latest/</a:t>
             </a:r>
-            <a:endParaRPr lang="de-DE" dirty="0"/>
-          </a:p>
-          <a:p>
-            <a:endParaRPr lang="de-DE" dirty="0"/>
-          </a:p>
-          <a:p>
-            <a:r>
-              <a:rPr lang="de-DE" sz="2000" dirty="0"/>
-              <a:t>Code </a:t>
-            </a:r>
-            <a:r>
-              <a:rPr lang="de-DE" sz="2000" dirty="0" err="1"/>
-              <a:t>pynetworking</a:t>
-            </a:r>
-            <a:r>
-              <a:rPr lang="de-DE" sz="2000" dirty="0"/>
-              <a:t>: </a:t>
-            </a:r>
-            <a:r>
-              <a:rPr lang="de-DE" sz="2000" dirty="0">
+            <a:endParaRPr lang="de-DE" noProof="1"/>
+          </a:p>
+          <a:p>
+            <a:endParaRPr lang="de-DE" noProof="1"/>
+          </a:p>
+          <a:p>
+            <a:r>
+              <a:rPr lang="de-DE" sz="2000" noProof="1"/>
+              <a:t>Code pynetworking: </a:t>
+            </a:r>
+            <a:r>
+              <a:rPr lang="de-DE" sz="2000" noProof="1">
                 <a:hlinkClick r:id="rId4"/>
               </a:rPr>
               <a:t>https://github.com/JulianSobott/pynetworking</a:t>
             </a:r>
-            <a:endParaRPr lang="de-DE" sz="2000" dirty="0"/>
+            <a:endParaRPr lang="de-DE" sz="2000" noProof="1"/>
           </a:p>
           <a:p>
             <a:pPr marL="0" indent="0">
               <a:buNone/>
             </a:pPr>
-            <a:endParaRPr lang="de-DE" dirty="0"/>
+            <a:endParaRPr lang="de-DE" noProof="1"/>
           </a:p>
         </p:txBody>
       </p:sp>
@@ -5313,4 +6133,299 @@
     </a:ext>
   </a:extLst>
 </a:theme>
+</file>
+
+<file path=ppt/theme/theme2.xml><?xml version="1.0" encoding="utf-8"?>
+<a:theme xmlns:a="http://schemas.openxmlformats.org/drawingml/2006/main" name="Office">
+  <a:themeElements>
+    <a:clrScheme name="Office">
+      <a:dk1>
+        <a:sysClr val="windowText" lastClr="000000"/>
+      </a:dk1>
+      <a:lt1>
+        <a:sysClr val="window" lastClr="FFFFFF"/>
+      </a:lt1>
+      <a:dk2>
+        <a:srgbClr val="44546A"/>
+      </a:dk2>
+      <a:lt2>
+        <a:srgbClr val="E7E6E6"/>
+      </a:lt2>
+      <a:accent1>
+        <a:srgbClr val="4472C4"/>
+      </a:accent1>
+      <a:accent2>
+        <a:srgbClr val="ED7D31"/>
+      </a:accent2>
+      <a:accent3>
+        <a:srgbClr val="A5A5A5"/>
+      </a:accent3>
+      <a:accent4>
+        <a:srgbClr val="FFC000"/>
+      </a:accent4>
+      <a:accent5>
+        <a:srgbClr val="5B9BD5"/>
+      </a:accent5>
+      <a:accent6>
+        <a:srgbClr val="70AD47"/>
+      </a:accent6>
+      <a:hlink>
+        <a:srgbClr val="0563C1"/>
+      </a:hlink>
+      <a:folHlink>
+        <a:srgbClr val="954F72"/>
+      </a:folHlink>
+    </a:clrScheme>
+    <a:fontScheme name="Office">
+      <a:majorFont>
+        <a:latin typeface="Calibri Light" panose="020F0302020204030204"/>
+        <a:ea typeface=""/>
+        <a:cs typeface=""/>
+        <a:font script="Jpan" typeface="游ゴシック Light"/>
+        <a:font script="Hang" typeface="맑은 고딕"/>
+        <a:font script="Hans" typeface="等线 Light"/>
+        <a:font script="Hant" typeface="新細明體"/>
+        <a:font script="Arab" typeface="Times New Roman"/>
+        <a:font script="Hebr" typeface="Times New Roman"/>
+        <a:font script="Thai" typeface="Angsana New"/>
+        <a:font script="Ethi" typeface="Nyala"/>
+        <a:font script="Beng" typeface="Vrinda"/>
+        <a:font script="Gujr" typeface="Shruti"/>
+        <a:font script="Khmr" typeface="MoolBoran"/>
+        <a:font script="Knda" typeface="Tunga"/>
+        <a:font script="Guru" typeface="Raavi"/>
+        <a:font script="Cans" typeface="Euphemia"/>
+        <a:font script="Cher" typeface="Plantagenet Cherokee"/>
+        <a:font script="Yiii" typeface="Microsoft Yi Baiti"/>
+        <a:font script="Tibt" typeface="Microsoft Himalaya"/>
+        <a:font script="Thaa" typeface="MV Boli"/>
+        <a:font script="Deva" typeface="Mangal"/>
+        <a:font script="Telu" typeface="Gautami"/>
+        <a:font script="Taml" typeface="Latha"/>
+        <a:font script="Syrc" typeface="Estrangelo Edessa"/>
+        <a:font script="Orya" typeface="Kalinga"/>
+        <a:font script="Mlym" typeface="Kartika"/>
+        <a:font script="Laoo" typeface="DokChampa"/>
+        <a:font script="Sinh" typeface="Iskoola Pota"/>
+        <a:font script="Mong" typeface="Mongolian Baiti"/>
+        <a:font script="Viet" typeface="Times New Roman"/>
+        <a:font script="Uigh" typeface="Microsoft Uighur"/>
+        <a:font script="Geor" typeface="Sylfaen"/>
+        <a:font script="Armn" typeface="Arial"/>
+        <a:font script="Bugi" typeface="Leelawadee UI"/>
+        <a:font script="Bopo" typeface="Microsoft JhengHei"/>
+        <a:font script="Java" typeface="Javanese Text"/>
+        <a:font script="Lisu" typeface="Segoe UI"/>
+        <a:font script="Mymr" typeface="Myanmar Text"/>
+        <a:font script="Nkoo" typeface="Ebrima"/>
+        <a:font script="Olck" typeface="Nirmala UI"/>
+        <a:font script="Osma" typeface="Ebrima"/>
+        <a:font script="Phag" typeface="Phagspa"/>
+        <a:font script="Syrn" typeface="Estrangelo Edessa"/>
+        <a:font script="Syrj" typeface="Estrangelo Edessa"/>
+        <a:font script="Syre" typeface="Estrangelo Edessa"/>
+        <a:font script="Sora" typeface="Nirmala UI"/>
+        <a:font script="Tale" typeface="Microsoft Tai Le"/>
+        <a:font script="Talu" typeface="Microsoft New Tai Lue"/>
+        <a:font script="Tfng" typeface="Ebrima"/>
+      </a:majorFont>
+      <a:minorFont>
+        <a:latin typeface="Calibri" panose="020F0502020204030204"/>
+        <a:ea typeface=""/>
+        <a:cs typeface=""/>
+        <a:font script="Jpan" typeface="游ゴシック"/>
+        <a:font script="Hang" typeface="맑은 고딕"/>
+        <a:font script="Hans" typeface="等线"/>
+        <a:font script="Hant" typeface="新細明體"/>
+        <a:font script="Arab" typeface="Arial"/>
+        <a:font script="Hebr" typeface="Arial"/>
+        <a:font script="Thai" typeface="Cordia New"/>
+        <a:font script="Ethi" typeface="Nyala"/>
+        <a:font script="Beng" typeface="Vrinda"/>
+        <a:font script="Gujr" typeface="Shruti"/>
+        <a:font script="Khmr" typeface="DaunPenh"/>
+        <a:font script="Knda" typeface="Tunga"/>
+        <a:font script="Guru" typeface="Raavi"/>
+        <a:font script="Cans" typeface="Euphemia"/>
+        <a:font script="Cher" typeface="Plantagenet Cherokee"/>
+        <a:font script="Yiii" typeface="Microsoft Yi Baiti"/>
+        <a:font script="Tibt" typeface="Microsoft Himalaya"/>
+        <a:font script="Thaa" typeface="MV Boli"/>
+        <a:font script="Deva" typeface="Mangal"/>
+        <a:font script="Telu" typeface="Gautami"/>
+        <a:font script="Taml" typeface="Latha"/>
+        <a:font script="Syrc" typeface="Estrangelo Edessa"/>
+        <a:font script="Orya" typeface="Kalinga"/>
+        <a:font script="Mlym" typeface="Kartika"/>
+        <a:font script="Laoo" typeface="DokChampa"/>
+        <a:font script="Sinh" typeface="Iskoola Pota"/>
+        <a:font script="Mong" typeface="Mongolian Baiti"/>
+        <a:font script="Viet" typeface="Arial"/>
+        <a:font script="Uigh" typeface="Microsoft Uighur"/>
+        <a:font script="Geor" typeface="Sylfaen"/>
+        <a:font script="Armn" typeface="Arial"/>
+        <a:font script="Bugi" typeface="Leelawadee UI"/>
+        <a:font script="Bopo" typeface="Microsoft JhengHei"/>
+        <a:font script="Java" typeface="Javanese Text"/>
+        <a:font script="Lisu" typeface="Segoe UI"/>
+        <a:font script="Mymr" typeface="Myanmar Text"/>
+        <a:font script="Nkoo" typeface="Ebrima"/>
+        <a:font script="Olck" typeface="Nirmala UI"/>
+        <a:font script="Osma" typeface="Ebrima"/>
+        <a:font script="Phag" typeface="Phagspa"/>
+        <a:font script="Syrn" typeface="Estrangelo Edessa"/>
+        <a:font script="Syrj" typeface="Estrangelo Edessa"/>
+        <a:font script="Syre" typeface="Estrangelo Edessa"/>
+        <a:font script="Sora" typeface="Nirmala UI"/>
+        <a:font script="Tale" typeface="Microsoft Tai Le"/>
+        <a:font script="Talu" typeface="Microsoft New Tai Lue"/>
+        <a:font script="Tfng" typeface="Ebrima"/>
+      </a:minorFont>
+    </a:fontScheme>
+    <a:fmtScheme name="Office">
+      <a:fillStyleLst>
+        <a:solidFill>
+          <a:schemeClr val="phClr"/>
+        </a:solidFill>
+        <a:gradFill rotWithShape="1">
+          <a:gsLst>
+            <a:gs pos="0">
+              <a:schemeClr val="phClr">
+                <a:lumMod val="110000"/>
+                <a:satMod val="105000"/>
+                <a:tint val="67000"/>
+              </a:schemeClr>
+            </a:gs>
+            <a:gs pos="50000">
+              <a:schemeClr val="phClr">
+                <a:lumMod val="105000"/>
+                <a:satMod val="103000"/>
+                <a:tint val="73000"/>
+              </a:schemeClr>
+            </a:gs>
+            <a:gs pos="100000">
+              <a:schemeClr val="phClr">
+                <a:lumMod val="105000"/>
+                <a:satMod val="109000"/>
+                <a:tint val="81000"/>
+              </a:schemeClr>
+            </a:gs>
+          </a:gsLst>
+          <a:lin ang="5400000" scaled="0"/>
+        </a:gradFill>
+        <a:gradFill rotWithShape="1">
+          <a:gsLst>
+            <a:gs pos="0">
+              <a:schemeClr val="phClr">
+                <a:satMod val="103000"/>
+                <a:lumMod val="102000"/>
+                <a:tint val="94000"/>
+              </a:schemeClr>
+            </a:gs>
+            <a:gs pos="50000">
+              <a:schemeClr val="phClr">
+                <a:satMod val="110000"/>
+                <a:lumMod val="100000"/>
+                <a:shade val="100000"/>
+              </a:schemeClr>
+            </a:gs>
+            <a:gs pos="100000">
+              <a:schemeClr val="phClr">
+                <a:lumMod val="99000"/>
+                <a:satMod val="120000"/>
+                <a:shade val="78000"/>
+              </a:schemeClr>
+            </a:gs>
+          </a:gsLst>
+          <a:lin ang="5400000" scaled="0"/>
+        </a:gradFill>
+      </a:fillStyleLst>
+      <a:lnStyleLst>
+        <a:ln w="6350" cap="flat" cmpd="sng" algn="ctr">
+          <a:solidFill>
+            <a:schemeClr val="phClr"/>
+          </a:solidFill>
+          <a:prstDash val="solid"/>
+          <a:miter lim="800000"/>
+        </a:ln>
+        <a:ln w="12700" cap="flat" cmpd="sng" algn="ctr">
+          <a:solidFill>
+            <a:schemeClr val="phClr"/>
+          </a:solidFill>
+          <a:prstDash val="solid"/>
+          <a:miter lim="800000"/>
+        </a:ln>
+        <a:ln w="19050" cap="flat" cmpd="sng" algn="ctr">
+          <a:solidFill>
+            <a:schemeClr val="phClr"/>
+          </a:solidFill>
+          <a:prstDash val="solid"/>
+          <a:miter lim="800000"/>
+        </a:ln>
+      </a:lnStyleLst>
+      <a:effectStyleLst>
+        <a:effectStyle>
+          <a:effectLst/>
+        </a:effectStyle>
+        <a:effectStyle>
+          <a:effectLst/>
+        </a:effectStyle>
+        <a:effectStyle>
+          <a:effectLst>
+            <a:outerShdw blurRad="57150" dist="19050" dir="5400000" algn="ctr" rotWithShape="0">
+              <a:srgbClr val="000000">
+                <a:alpha val="63000"/>
+              </a:srgbClr>
+            </a:outerShdw>
+          </a:effectLst>
+        </a:effectStyle>
+      </a:effectStyleLst>
+      <a:bgFillStyleLst>
+        <a:solidFill>
+          <a:schemeClr val="phClr"/>
+        </a:solidFill>
+        <a:solidFill>
+          <a:schemeClr val="phClr">
+            <a:tint val="95000"/>
+            <a:satMod val="170000"/>
+          </a:schemeClr>
+        </a:solidFill>
+        <a:gradFill rotWithShape="1">
+          <a:gsLst>
+            <a:gs pos="0">
+              <a:schemeClr val="phClr">
+                <a:tint val="93000"/>
+                <a:satMod val="150000"/>
+                <a:shade val="98000"/>
+                <a:lumMod val="102000"/>
+              </a:schemeClr>
+            </a:gs>
+            <a:gs pos="50000">
+              <a:schemeClr val="phClr">
+                <a:tint val="98000"/>
+                <a:satMod val="130000"/>
+                <a:shade val="90000"/>
+                <a:lumMod val="103000"/>
+              </a:schemeClr>
+            </a:gs>
+            <a:gs pos="100000">
+              <a:schemeClr val="phClr">
+                <a:shade val="63000"/>
+                <a:satMod val="120000"/>
+              </a:schemeClr>
+            </a:gs>
+          </a:gsLst>
+          <a:lin ang="5400000" scaled="0"/>
+        </a:gradFill>
+      </a:bgFillStyleLst>
+    </a:fmtScheme>
+  </a:themeElements>
+  <a:objectDefaults/>
+  <a:extraClrSchemeLst/>
+  <a:extLst>
+    <a:ext uri="{05A4C25C-085E-4340-85A3-A5531E510DB2}">
+      <thm15:themeFamily xmlns:thm15="http://schemas.microsoft.com/office/thememl/2012/main" name="Office Theme" id="{62F939B6-93AF-4DB8-9C6B-D6C7DFDC589F}" vid="{4A3C46E8-61CC-4603-A589-7422A47A8E4A}"/>
+    </a:ext>
+  </a:extLst>
+</a:theme>
 </file>
</xml_diff>